<commit_message>
Added experimental results (fuzzbench + log annotation)
</commit_message>
<xml_diff>
--- a/project-proposal-debug-info-symptr-boundaries/project-proposal-presentation.pptx
+++ b/project-proposal-debug-info-symptr-boundaries/project-proposal-presentation.pptx
@@ -233,7 +233,7 @@
           <a:p>
             <a:fld id="{39BC7E9A-FBD4-4784-B491-1AC3E5D9E561}" type="datetimeFigureOut">
               <a:rPr lang="en-US" smtClean="0"/>
-              <a:t>28-Mar-23</a:t>
+              <a:t>02-Apr-23</a:t>
             </a:fld>
             <a:endParaRPr lang="en-US"/>
           </a:p>
@@ -410,7 +410,7 @@
           <a:p>
             <a:fld id="{50E63093-46C8-48AC-A118-5C09AB35883B}" type="datetimeFigureOut">
               <a:rPr lang="en-US" smtClean="0"/>
-              <a:t>28-Mar-23</a:t>
+              <a:t>02-Apr-23</a:t>
             </a:fld>
             <a:endParaRPr lang="en-US"/>
           </a:p>
@@ -3196,7 +3196,7 @@
           <a:p>
             <a:fld id="{B5666DB2-E251-43AB-BA7A-537A5F596847}" type="datetime1">
               <a:rPr lang="en-US" smtClean="0"/>
-              <a:t>28-Mar-23</a:t>
+              <a:t>02-Apr-23</a:t>
             </a:fld>
             <a:endParaRPr lang="en-US"/>
           </a:p>
@@ -3394,7 +3394,7 @@
           <a:p>
             <a:fld id="{278C2BC2-DEF5-4195-9369-95FC0BB3E65C}" type="datetime1">
               <a:rPr lang="en-US" smtClean="0"/>
-              <a:t>28-Mar-23</a:t>
+              <a:t>02-Apr-23</a:t>
             </a:fld>
             <a:endParaRPr lang="en-US"/>
           </a:p>
@@ -3602,7 +3602,7 @@
           <a:p>
             <a:fld id="{74AA2B5B-D6EC-44B1-80B6-EC13BACD8180}" type="datetime1">
               <a:rPr lang="en-US" smtClean="0"/>
-              <a:t>28-Mar-23</a:t>
+              <a:t>02-Apr-23</a:t>
             </a:fld>
             <a:endParaRPr lang="en-US"/>
           </a:p>
@@ -3800,7 +3800,7 @@
           <a:p>
             <a:fld id="{D6FB444C-4752-47B7-8500-566804BDB595}" type="datetime1">
               <a:rPr lang="en-US" smtClean="0"/>
-              <a:t>28-Mar-23</a:t>
+              <a:t>02-Apr-23</a:t>
             </a:fld>
             <a:endParaRPr lang="en-US"/>
           </a:p>
@@ -4075,7 +4075,7 @@
           <a:p>
             <a:fld id="{9E01AEB8-F872-4589-AC49-9FAF9A721686}" type="datetime1">
               <a:rPr lang="en-US" smtClean="0"/>
-              <a:t>28-Mar-23</a:t>
+              <a:t>02-Apr-23</a:t>
             </a:fld>
             <a:endParaRPr lang="en-US"/>
           </a:p>
@@ -4340,7 +4340,7 @@
           <a:p>
             <a:fld id="{A52134ED-F8BC-4A77-AE61-1A7C5D9C7BEE}" type="datetime1">
               <a:rPr lang="en-US" smtClean="0"/>
-              <a:t>28-Mar-23</a:t>
+              <a:t>02-Apr-23</a:t>
             </a:fld>
             <a:endParaRPr lang="en-US"/>
           </a:p>
@@ -4752,7 +4752,7 @@
           <a:p>
             <a:fld id="{13242825-6903-42B3-ABA8-16D9F1B0A2A4}" type="datetime1">
               <a:rPr lang="en-US" smtClean="0"/>
-              <a:t>28-Mar-23</a:t>
+              <a:t>02-Apr-23</a:t>
             </a:fld>
             <a:endParaRPr lang="en-US"/>
           </a:p>
@@ -4893,7 +4893,7 @@
           <a:p>
             <a:fld id="{A68D6221-BFC0-4A92-8590-DE9BAB69F435}" type="datetime1">
               <a:rPr lang="en-US" smtClean="0"/>
-              <a:t>28-Mar-23</a:t>
+              <a:t>02-Apr-23</a:t>
             </a:fld>
             <a:endParaRPr lang="en-US"/>
           </a:p>
@@ -5006,7 +5006,7 @@
           <a:p>
             <a:fld id="{63432E8C-C5F1-460B-BDF4-96435BECB4CE}" type="datetime1">
               <a:rPr lang="en-US" smtClean="0"/>
-              <a:t>28-Mar-23</a:t>
+              <a:t>02-Apr-23</a:t>
             </a:fld>
             <a:endParaRPr lang="en-US"/>
           </a:p>
@@ -5317,7 +5317,7 @@
           <a:p>
             <a:fld id="{10EF844A-9ABC-4580-B361-29EF5BD7F607}" type="datetime1">
               <a:rPr lang="en-US" smtClean="0"/>
-              <a:t>28-Mar-23</a:t>
+              <a:t>02-Apr-23</a:t>
             </a:fld>
             <a:endParaRPr lang="en-US"/>
           </a:p>
@@ -5605,7 +5605,7 @@
           <a:p>
             <a:fld id="{91C3C48B-8AC2-4D13-836F-FB00B84FEA3B}" type="datetime1">
               <a:rPr lang="en-US" smtClean="0"/>
-              <a:t>28-Mar-23</a:t>
+              <a:t>02-Apr-23</a:t>
             </a:fld>
             <a:endParaRPr lang="en-US"/>
           </a:p>
@@ -5849,7 +5849,7 @@
           <a:p>
             <a:fld id="{A42D7723-690C-44B8-9522-4DEAA506A498}" type="datetime1">
               <a:rPr lang="en-US" smtClean="0"/>
-              <a:t>28-Mar-23</a:t>
+              <a:t>02-Apr-23</a:t>
             </a:fld>
             <a:endParaRPr lang="en-US"/>
           </a:p>
@@ -6392,6 +6392,42 @@
           </a:prstGeom>
         </p:spPr>
       </p:pic>
+      <p:pic>
+        <p:nvPicPr>
+          <p:cNvPr id="6" name="Picture 5">
+            <a:extLst>
+              <a:ext uri="{FF2B5EF4-FFF2-40B4-BE49-F238E27FC236}">
+                <a16:creationId xmlns:a16="http://schemas.microsoft.com/office/drawing/2014/main" id="{459F5D05-2B3F-4592-A24B-0BEDADBCAD8B}"/>
+              </a:ext>
+            </a:extLst>
+          </p:cNvPr>
+          <p:cNvPicPr>
+            <a:picLocks noChangeAspect="1"/>
+          </p:cNvPicPr>
+          <p:nvPr/>
+        </p:nvPicPr>
+        <p:blipFill>
+          <a:blip r:embed="rId3">
+            <a:extLst>
+              <a:ext uri="{28A0092B-C50C-407E-A947-70E740481C1C}">
+                <a14:useLocalDpi xmlns:a14="http://schemas.microsoft.com/office/drawing/2010/main" val="0"/>
+              </a:ext>
+            </a:extLst>
+          </a:blip>
+          <a:stretch>
+            <a:fillRect/>
+          </a:stretch>
+        </p:blipFill>
+        <p:spPr>
+          <a:xfrm>
+            <a:off x="258232" y="-522178"/>
+            <a:ext cx="2103967" cy="2103967"/>
+          </a:xfrm>
+          <a:prstGeom prst="rect">
+            <a:avLst/>
+          </a:prstGeom>
+        </p:spPr>
+      </p:pic>
     </p:spTree>
     <p:extLst>
       <p:ext uri="{BB962C8B-B14F-4D97-AF65-F5344CB8AC3E}">
@@ -10436,7 +10472,7 @@
         </p:spPr>
         <p:txBody>
           <a:bodyPr>
-            <a:normAutofit/>
+            <a:normAutofit lnSpcReduction="10000"/>
           </a:bodyPr>
           <a:lstStyle/>
           <a:p>
@@ -10446,7 +10482,7 @@
             </a:pPr>
             <a:r>
               <a:rPr lang="en-US" sz="3600" dirty="0"/>
-              <a:t>The method has already been implemented, and a number of preliminary experiments are in progress</a:t>
+              <a:t>The method has already been implemented as a part of the Sydr tool, and a number of preliminary experiments are in progress</a:t>
             </a:r>
           </a:p>
           <a:p>

</xml_diff>